<commit_message>
all inctrustions are ready and validated
</commit_message>
<xml_diff>
--- a/Push_swap.pptx
+++ b/Push_swap.pptx
@@ -20439,7 +20439,7 @@
           <a:p>
             <a:fld id="{52B7C498-19DA-0F4B-A125-2CE9A38A79D6}" type="datetimeFigureOut">
               <a:rPr lang="ru-RU" smtClean="0"/>
-              <a:t>24.02.2020</a:t>
+              <a:t>25.02.2020</a:t>
             </a:fld>
             <a:endParaRPr lang="ru-RU"/>
           </a:p>
@@ -20612,7 +20612,7 @@
           <a:p>
             <a:fld id="{52B7C498-19DA-0F4B-A125-2CE9A38A79D6}" type="datetimeFigureOut">
               <a:rPr lang="ru-RU" smtClean="0"/>
-              <a:t>24.02.2020</a:t>
+              <a:t>25.02.2020</a:t>
             </a:fld>
             <a:endParaRPr lang="ru-RU"/>
           </a:p>
@@ -20795,7 +20795,7 @@
           <a:p>
             <a:fld id="{52B7C498-19DA-0F4B-A125-2CE9A38A79D6}" type="datetimeFigureOut">
               <a:rPr lang="ru-RU" smtClean="0"/>
-              <a:t>24.02.2020</a:t>
+              <a:t>25.02.2020</a:t>
             </a:fld>
             <a:endParaRPr lang="ru-RU"/>
           </a:p>
@@ -20968,7 +20968,7 @@
           <a:p>
             <a:fld id="{52B7C498-19DA-0F4B-A125-2CE9A38A79D6}" type="datetimeFigureOut">
               <a:rPr lang="ru-RU" smtClean="0"/>
-              <a:t>24.02.2020</a:t>
+              <a:t>25.02.2020</a:t>
             </a:fld>
             <a:endParaRPr lang="ru-RU"/>
           </a:p>
@@ -21246,7 +21246,7 @@
           <a:p>
             <a:fld id="{52B7C498-19DA-0F4B-A125-2CE9A38A79D6}" type="datetimeFigureOut">
               <a:rPr lang="ru-RU" smtClean="0"/>
-              <a:t>24.02.2020</a:t>
+              <a:t>25.02.2020</a:t>
             </a:fld>
             <a:endParaRPr lang="ru-RU"/>
           </a:p>
@@ -21461,7 +21461,7 @@
           <a:p>
             <a:fld id="{52B7C498-19DA-0F4B-A125-2CE9A38A79D6}" type="datetimeFigureOut">
               <a:rPr lang="ru-RU" smtClean="0"/>
-              <a:t>24.02.2020</a:t>
+              <a:t>25.02.2020</a:t>
             </a:fld>
             <a:endParaRPr lang="ru-RU"/>
           </a:p>
@@ -21829,7 +21829,7 @@
           <a:p>
             <a:fld id="{52B7C498-19DA-0F4B-A125-2CE9A38A79D6}" type="datetimeFigureOut">
               <a:rPr lang="ru-RU" smtClean="0"/>
-              <a:t>24.02.2020</a:t>
+              <a:t>25.02.2020</a:t>
             </a:fld>
             <a:endParaRPr lang="ru-RU"/>
           </a:p>
@@ -21970,7 +21970,7 @@
           <a:p>
             <a:fld id="{52B7C498-19DA-0F4B-A125-2CE9A38A79D6}" type="datetimeFigureOut">
               <a:rPr lang="ru-RU" smtClean="0"/>
-              <a:t>24.02.2020</a:t>
+              <a:t>25.02.2020</a:t>
             </a:fld>
             <a:endParaRPr lang="ru-RU"/>
           </a:p>
@@ -22083,7 +22083,7 @@
           <a:p>
             <a:fld id="{52B7C498-19DA-0F4B-A125-2CE9A38A79D6}" type="datetimeFigureOut">
               <a:rPr lang="ru-RU" smtClean="0"/>
-              <a:t>24.02.2020</a:t>
+              <a:t>25.02.2020</a:t>
             </a:fld>
             <a:endParaRPr lang="ru-RU"/>
           </a:p>
@@ -22372,7 +22372,7 @@
           <a:p>
             <a:fld id="{52B7C498-19DA-0F4B-A125-2CE9A38A79D6}" type="datetimeFigureOut">
               <a:rPr lang="ru-RU" smtClean="0"/>
-              <a:t>24.02.2020</a:t>
+              <a:t>25.02.2020</a:t>
             </a:fld>
             <a:endParaRPr lang="ru-RU"/>
           </a:p>
@@ -22663,7 +22663,7 @@
           <a:p>
             <a:fld id="{52B7C498-19DA-0F4B-A125-2CE9A38A79D6}" type="datetimeFigureOut">
               <a:rPr lang="ru-RU" smtClean="0"/>
-              <a:t>24.02.2020</a:t>
+              <a:t>25.02.2020</a:t>
             </a:fld>
             <a:endParaRPr lang="ru-RU"/>
           </a:p>
@@ -22879,7 +22879,7 @@
           <a:p>
             <a:fld id="{52B7C498-19DA-0F4B-A125-2CE9A38A79D6}" type="datetimeFigureOut">
               <a:rPr lang="ru-RU" smtClean="0"/>
-              <a:t>24.02.2020</a:t>
+              <a:t>25.02.2020</a:t>
             </a:fld>
             <a:endParaRPr lang="ru-RU"/>
           </a:p>

</xml_diff>